<commit_message>
fix: week 4 lecture
</commit_message>
<xml_diff>
--- a/04 - Week/4 - Solutions.pptx
+++ b/04 - Week/4 - Solutions.pptx
@@ -212,130 +212,6 @@
 
 <file path=ppt/changesInfos/changesInfo1.xml><?xml version="1.0" encoding="utf-8"?>
 <pc:chgInfo xmlns:a="http://schemas.openxmlformats.org/drawingml/2006/main" xmlns:r="http://schemas.openxmlformats.org/officeDocument/2006/relationships" xmlns:ac="http://schemas.microsoft.com/office/drawing/2013/main/command" xmlns:pc="http://schemas.microsoft.com/office/powerpoint/2013/main/command">
-  <pc:docChgLst>
-    <pc:chgData name="Lipani, Aldo" userId="3d811883-7188-4056-86e4-ebeb30c53017" providerId="ADAL" clId="{3215D4EB-4E6F-1E44-BC52-19D9BFC4C212}"/>
-    <pc:docChg chg="undo custSel addSld delSld modSld sldOrd">
-      <pc:chgData name="Lipani, Aldo" userId="3d811883-7188-4056-86e4-ebeb30c53017" providerId="ADAL" clId="{3215D4EB-4E6F-1E44-BC52-19D9BFC4C212}" dt="2019-10-14T12:29:55.095" v="14738" actId="20577"/>
-      <pc:docMkLst>
-        <pc:docMk/>
-      </pc:docMkLst>
-      <pc:sldChg chg="modSp">
-        <pc:chgData name="Lipani, Aldo" userId="3d811883-7188-4056-86e4-ebeb30c53017" providerId="ADAL" clId="{3215D4EB-4E6F-1E44-BC52-19D9BFC4C212}" dt="2019-10-12T12:38:46.830" v="913" actId="20577"/>
-        <pc:sldMkLst>
-          <pc:docMk/>
-          <pc:sldMk cId="3972362767" sldId="555"/>
-        </pc:sldMkLst>
-        <pc:spChg chg="mod">
-          <ac:chgData name="Lipani, Aldo" userId="3d811883-7188-4056-86e4-ebeb30c53017" providerId="ADAL" clId="{3215D4EB-4E6F-1E44-BC52-19D9BFC4C212}" dt="2019-10-12T12:38:46.830" v="913" actId="20577"/>
-          <ac:spMkLst>
-            <pc:docMk/>
-            <pc:sldMk cId="3972362767" sldId="555"/>
-            <ac:spMk id="4099" creationId="{00000000-0000-0000-0000-000000000000}"/>
-          </ac:spMkLst>
-        </pc:spChg>
-      </pc:sldChg>
-      <pc:sldChg chg="addSp modSp add">
-        <pc:chgData name="Lipani, Aldo" userId="3d811883-7188-4056-86e4-ebeb30c53017" providerId="ADAL" clId="{3215D4EB-4E6F-1E44-BC52-19D9BFC4C212}" dt="2019-10-12T12:39:41.613" v="931" actId="20577"/>
-        <pc:sldMkLst>
-          <pc:docMk/>
-          <pc:sldMk cId="3034892166" sldId="747"/>
-        </pc:sldMkLst>
-        <pc:spChg chg="add mod">
-          <ac:chgData name="Lipani, Aldo" userId="3d811883-7188-4056-86e4-ebeb30c53017" providerId="ADAL" clId="{3215D4EB-4E6F-1E44-BC52-19D9BFC4C212}" dt="2019-10-12T12:39:33.193" v="918" actId="14100"/>
-          <ac:spMkLst>
-            <pc:docMk/>
-            <pc:sldMk cId="3034892166" sldId="747"/>
-            <ac:spMk id="7" creationId="{7A61E9B4-ECB3-EA49-ABA0-C622C462EC43}"/>
-          </ac:spMkLst>
-        </pc:spChg>
-        <pc:spChg chg="add mod">
-          <ac:chgData name="Lipani, Aldo" userId="3d811883-7188-4056-86e4-ebeb30c53017" providerId="ADAL" clId="{3215D4EB-4E6F-1E44-BC52-19D9BFC4C212}" dt="2019-10-12T12:39:41.613" v="931" actId="20577"/>
-          <ac:spMkLst>
-            <pc:docMk/>
-            <pc:sldMk cId="3034892166" sldId="747"/>
-            <ac:spMk id="9" creationId="{506456D1-DD92-DE43-87E5-0801F7E6138D}"/>
-          </ac:spMkLst>
-        </pc:spChg>
-      </pc:sldChg>
-      <pc:sldChg chg="addSp modSp add">
-        <pc:chgData name="Lipani, Aldo" userId="3d811883-7188-4056-86e4-ebeb30c53017" providerId="ADAL" clId="{3215D4EB-4E6F-1E44-BC52-19D9BFC4C212}" dt="2019-10-14T07:33:13.363" v="12545" actId="1076"/>
-        <pc:sldMkLst>
-          <pc:docMk/>
-          <pc:sldMk cId="1434595258" sldId="774"/>
-        </pc:sldMkLst>
-        <pc:spChg chg="add mod">
-          <ac:chgData name="Lipani, Aldo" userId="3d811883-7188-4056-86e4-ebeb30c53017" providerId="ADAL" clId="{3215D4EB-4E6F-1E44-BC52-19D9BFC4C212}" dt="2019-10-14T07:32:26.912" v="12544" actId="1076"/>
-          <ac:spMkLst>
-            <pc:docMk/>
-            <pc:sldMk cId="1434595258" sldId="774"/>
-            <ac:spMk id="2" creationId="{9AE5409A-9286-7044-A1EA-52438B22570C}"/>
-          </ac:spMkLst>
-        </pc:spChg>
-        <pc:spChg chg="mod">
-          <ac:chgData name="Lipani, Aldo" userId="3d811883-7188-4056-86e4-ebeb30c53017" providerId="ADAL" clId="{3215D4EB-4E6F-1E44-BC52-19D9BFC4C212}" dt="2019-10-14T07:33:13.363" v="12545" actId="1076"/>
-          <ac:spMkLst>
-            <pc:docMk/>
-            <pc:sldMk cId="1434595258" sldId="774"/>
-            <ac:spMk id="18" creationId="{72724FD1-1382-D145-B1B6-6C1EFC4C7110}"/>
-          </ac:spMkLst>
-        </pc:spChg>
-        <pc:picChg chg="mod">
-          <ac:chgData name="Lipani, Aldo" userId="3d811883-7188-4056-86e4-ebeb30c53017" providerId="ADAL" clId="{3215D4EB-4E6F-1E44-BC52-19D9BFC4C212}" dt="2019-10-14T07:33:13.363" v="12545" actId="1076"/>
-          <ac:picMkLst>
-            <pc:docMk/>
-            <pc:sldMk cId="1434595258" sldId="774"/>
-            <ac:picMk id="17" creationId="{5BDDDEFB-CFB0-6742-AADD-1DD215E11B8D}"/>
-          </ac:picMkLst>
-        </pc:picChg>
-      </pc:sldChg>
-      <pc:sldChg chg="modSp add ord">
-        <pc:chgData name="Lipani, Aldo" userId="3d811883-7188-4056-86e4-ebeb30c53017" providerId="ADAL" clId="{3215D4EB-4E6F-1E44-BC52-19D9BFC4C212}" dt="2019-10-12T12:40:12.953" v="943" actId="20577"/>
-        <pc:sldMkLst>
-          <pc:docMk/>
-          <pc:sldMk cId="844796453" sldId="783"/>
-        </pc:sldMkLst>
-        <pc:spChg chg="mod">
-          <ac:chgData name="Lipani, Aldo" userId="3d811883-7188-4056-86e4-ebeb30c53017" providerId="ADAL" clId="{3215D4EB-4E6F-1E44-BC52-19D9BFC4C212}" dt="2019-10-12T12:40:12.953" v="943" actId="20577"/>
-          <ac:spMkLst>
-            <pc:docMk/>
-            <pc:sldMk cId="844796453" sldId="783"/>
-            <ac:spMk id="6" creationId="{566B908A-85C8-D84C-A24B-BA8943763699}"/>
-          </ac:spMkLst>
-        </pc:spChg>
-      </pc:sldChg>
-      <pc:sldChg chg="add">
-        <pc:chgData name="Lipani, Aldo" userId="3d811883-7188-4056-86e4-ebeb30c53017" providerId="ADAL" clId="{3215D4EB-4E6F-1E44-BC52-19D9BFC4C212}" dt="2019-10-12T12:40:56.550" v="944"/>
-        <pc:sldMkLst>
-          <pc:docMk/>
-          <pc:sldMk cId="3816615933" sldId="814"/>
-        </pc:sldMkLst>
-      </pc:sldChg>
-    </pc:docChg>
-  </pc:docChgLst>
-  <pc:docChgLst>
-    <pc:chgData name="Lipani, Aldo" userId="3d811883-7188-4056-86e4-ebeb30c53017" providerId="ADAL" clId="{D276DF11-7755-1742-A60E-641ACB413E1F}"/>
-    <pc:docChg chg="undo custSel modSld sldOrd">
-      <pc:chgData name="Lipani, Aldo" userId="3d811883-7188-4056-86e4-ebeb30c53017" providerId="ADAL" clId="{D276DF11-7755-1742-A60E-641ACB413E1F}" dt="2019-09-30T12:36:23.840" v="662" actId="1035"/>
-      <pc:docMkLst>
-        <pc:docMk/>
-      </pc:docMkLst>
-      <pc:sldChg chg="modSp">
-        <pc:chgData name="Lipani, Aldo" userId="3d811883-7188-4056-86e4-ebeb30c53017" providerId="ADAL" clId="{D276DF11-7755-1742-A60E-641ACB413E1F}" dt="2019-09-30T11:12:54.887" v="12" actId="20577"/>
-        <pc:sldMkLst>
-          <pc:docMk/>
-          <pc:sldMk cId="3972362767" sldId="555"/>
-        </pc:sldMkLst>
-        <pc:spChg chg="mod">
-          <ac:chgData name="Lipani, Aldo" userId="3d811883-7188-4056-86e4-ebeb30c53017" providerId="ADAL" clId="{D276DF11-7755-1742-A60E-641ACB413E1F}" dt="2019-09-30T11:12:54.887" v="12" actId="20577"/>
-          <ac:spMkLst>
-            <pc:docMk/>
-            <pc:sldMk cId="3972362767" sldId="555"/>
-            <ac:spMk id="4099" creationId="{00000000-0000-0000-0000-000000000000}"/>
-          </ac:spMkLst>
-        </pc:spChg>
-      </pc:sldChg>
-    </pc:docChg>
-  </pc:docChgLst>
   <pc:docChgLst>
     <pc:chgData name="Lipani, Aldo" userId="3d811883-7188-4056-86e4-ebeb30c53017" providerId="ADAL" clId="{1457813F-0612-9043-9EAA-808A886FE91F}"/>
     <pc:docChg chg="undo custSel addSld delSld modSld sldOrd">
@@ -3447,6 +3323,130 @@
     </pc:docChg>
   </pc:docChgLst>
   <pc:docChgLst>
+    <pc:chgData name="Lipani, Aldo" userId="3d811883-7188-4056-86e4-ebeb30c53017" providerId="ADAL" clId="{3215D4EB-4E6F-1E44-BC52-19D9BFC4C212}"/>
+    <pc:docChg chg="undo custSel addSld delSld modSld sldOrd">
+      <pc:chgData name="Lipani, Aldo" userId="3d811883-7188-4056-86e4-ebeb30c53017" providerId="ADAL" clId="{3215D4EB-4E6F-1E44-BC52-19D9BFC4C212}" dt="2019-10-14T12:29:55.095" v="14738" actId="20577"/>
+      <pc:docMkLst>
+        <pc:docMk/>
+      </pc:docMkLst>
+      <pc:sldChg chg="modSp">
+        <pc:chgData name="Lipani, Aldo" userId="3d811883-7188-4056-86e4-ebeb30c53017" providerId="ADAL" clId="{3215D4EB-4E6F-1E44-BC52-19D9BFC4C212}" dt="2019-10-12T12:38:46.830" v="913" actId="20577"/>
+        <pc:sldMkLst>
+          <pc:docMk/>
+          <pc:sldMk cId="3972362767" sldId="555"/>
+        </pc:sldMkLst>
+        <pc:spChg chg="mod">
+          <ac:chgData name="Lipani, Aldo" userId="3d811883-7188-4056-86e4-ebeb30c53017" providerId="ADAL" clId="{3215D4EB-4E6F-1E44-BC52-19D9BFC4C212}" dt="2019-10-12T12:38:46.830" v="913" actId="20577"/>
+          <ac:spMkLst>
+            <pc:docMk/>
+            <pc:sldMk cId="3972362767" sldId="555"/>
+            <ac:spMk id="4099" creationId="{00000000-0000-0000-0000-000000000000}"/>
+          </ac:spMkLst>
+        </pc:spChg>
+      </pc:sldChg>
+      <pc:sldChg chg="addSp modSp add">
+        <pc:chgData name="Lipani, Aldo" userId="3d811883-7188-4056-86e4-ebeb30c53017" providerId="ADAL" clId="{3215D4EB-4E6F-1E44-BC52-19D9BFC4C212}" dt="2019-10-12T12:39:41.613" v="931" actId="20577"/>
+        <pc:sldMkLst>
+          <pc:docMk/>
+          <pc:sldMk cId="3034892166" sldId="747"/>
+        </pc:sldMkLst>
+        <pc:spChg chg="add mod">
+          <ac:chgData name="Lipani, Aldo" userId="3d811883-7188-4056-86e4-ebeb30c53017" providerId="ADAL" clId="{3215D4EB-4E6F-1E44-BC52-19D9BFC4C212}" dt="2019-10-12T12:39:33.193" v="918" actId="14100"/>
+          <ac:spMkLst>
+            <pc:docMk/>
+            <pc:sldMk cId="3034892166" sldId="747"/>
+            <ac:spMk id="7" creationId="{7A61E9B4-ECB3-EA49-ABA0-C622C462EC43}"/>
+          </ac:spMkLst>
+        </pc:spChg>
+        <pc:spChg chg="add mod">
+          <ac:chgData name="Lipani, Aldo" userId="3d811883-7188-4056-86e4-ebeb30c53017" providerId="ADAL" clId="{3215D4EB-4E6F-1E44-BC52-19D9BFC4C212}" dt="2019-10-12T12:39:41.613" v="931" actId="20577"/>
+          <ac:spMkLst>
+            <pc:docMk/>
+            <pc:sldMk cId="3034892166" sldId="747"/>
+            <ac:spMk id="9" creationId="{506456D1-DD92-DE43-87E5-0801F7E6138D}"/>
+          </ac:spMkLst>
+        </pc:spChg>
+      </pc:sldChg>
+      <pc:sldChg chg="addSp modSp add">
+        <pc:chgData name="Lipani, Aldo" userId="3d811883-7188-4056-86e4-ebeb30c53017" providerId="ADAL" clId="{3215D4EB-4E6F-1E44-BC52-19D9BFC4C212}" dt="2019-10-14T07:33:13.363" v="12545" actId="1076"/>
+        <pc:sldMkLst>
+          <pc:docMk/>
+          <pc:sldMk cId="1434595258" sldId="774"/>
+        </pc:sldMkLst>
+        <pc:spChg chg="add mod">
+          <ac:chgData name="Lipani, Aldo" userId="3d811883-7188-4056-86e4-ebeb30c53017" providerId="ADAL" clId="{3215D4EB-4E6F-1E44-BC52-19D9BFC4C212}" dt="2019-10-14T07:32:26.912" v="12544" actId="1076"/>
+          <ac:spMkLst>
+            <pc:docMk/>
+            <pc:sldMk cId="1434595258" sldId="774"/>
+            <ac:spMk id="2" creationId="{9AE5409A-9286-7044-A1EA-52438B22570C}"/>
+          </ac:spMkLst>
+        </pc:spChg>
+        <pc:spChg chg="mod">
+          <ac:chgData name="Lipani, Aldo" userId="3d811883-7188-4056-86e4-ebeb30c53017" providerId="ADAL" clId="{3215D4EB-4E6F-1E44-BC52-19D9BFC4C212}" dt="2019-10-14T07:33:13.363" v="12545" actId="1076"/>
+          <ac:spMkLst>
+            <pc:docMk/>
+            <pc:sldMk cId="1434595258" sldId="774"/>
+            <ac:spMk id="18" creationId="{72724FD1-1382-D145-B1B6-6C1EFC4C7110}"/>
+          </ac:spMkLst>
+        </pc:spChg>
+        <pc:picChg chg="mod">
+          <ac:chgData name="Lipani, Aldo" userId="3d811883-7188-4056-86e4-ebeb30c53017" providerId="ADAL" clId="{3215D4EB-4E6F-1E44-BC52-19D9BFC4C212}" dt="2019-10-14T07:33:13.363" v="12545" actId="1076"/>
+          <ac:picMkLst>
+            <pc:docMk/>
+            <pc:sldMk cId="1434595258" sldId="774"/>
+            <ac:picMk id="17" creationId="{5BDDDEFB-CFB0-6742-AADD-1DD215E11B8D}"/>
+          </ac:picMkLst>
+        </pc:picChg>
+      </pc:sldChg>
+      <pc:sldChg chg="modSp add ord">
+        <pc:chgData name="Lipani, Aldo" userId="3d811883-7188-4056-86e4-ebeb30c53017" providerId="ADAL" clId="{3215D4EB-4E6F-1E44-BC52-19D9BFC4C212}" dt="2019-10-12T12:40:12.953" v="943" actId="20577"/>
+        <pc:sldMkLst>
+          <pc:docMk/>
+          <pc:sldMk cId="844796453" sldId="783"/>
+        </pc:sldMkLst>
+        <pc:spChg chg="mod">
+          <ac:chgData name="Lipani, Aldo" userId="3d811883-7188-4056-86e4-ebeb30c53017" providerId="ADAL" clId="{3215D4EB-4E6F-1E44-BC52-19D9BFC4C212}" dt="2019-10-12T12:40:12.953" v="943" actId="20577"/>
+          <ac:spMkLst>
+            <pc:docMk/>
+            <pc:sldMk cId="844796453" sldId="783"/>
+            <ac:spMk id="6" creationId="{566B908A-85C8-D84C-A24B-BA8943763699}"/>
+          </ac:spMkLst>
+        </pc:spChg>
+      </pc:sldChg>
+      <pc:sldChg chg="add">
+        <pc:chgData name="Lipani, Aldo" userId="3d811883-7188-4056-86e4-ebeb30c53017" providerId="ADAL" clId="{3215D4EB-4E6F-1E44-BC52-19D9BFC4C212}" dt="2019-10-12T12:40:56.550" v="944"/>
+        <pc:sldMkLst>
+          <pc:docMk/>
+          <pc:sldMk cId="3816615933" sldId="814"/>
+        </pc:sldMkLst>
+      </pc:sldChg>
+    </pc:docChg>
+  </pc:docChgLst>
+  <pc:docChgLst>
+    <pc:chgData name="Lipani, Aldo" userId="3d811883-7188-4056-86e4-ebeb30c53017" providerId="ADAL" clId="{D276DF11-7755-1742-A60E-641ACB413E1F}"/>
+    <pc:docChg chg="undo custSel modSld sldOrd">
+      <pc:chgData name="Lipani, Aldo" userId="3d811883-7188-4056-86e4-ebeb30c53017" providerId="ADAL" clId="{D276DF11-7755-1742-A60E-641ACB413E1F}" dt="2019-09-30T12:36:23.840" v="662" actId="1035"/>
+      <pc:docMkLst>
+        <pc:docMk/>
+      </pc:docMkLst>
+      <pc:sldChg chg="modSp">
+        <pc:chgData name="Lipani, Aldo" userId="3d811883-7188-4056-86e4-ebeb30c53017" providerId="ADAL" clId="{D276DF11-7755-1742-A60E-641ACB413E1F}" dt="2019-09-30T11:12:54.887" v="12" actId="20577"/>
+        <pc:sldMkLst>
+          <pc:docMk/>
+          <pc:sldMk cId="3972362767" sldId="555"/>
+        </pc:sldMkLst>
+        <pc:spChg chg="mod">
+          <ac:chgData name="Lipani, Aldo" userId="3d811883-7188-4056-86e4-ebeb30c53017" providerId="ADAL" clId="{D276DF11-7755-1742-A60E-641ACB413E1F}" dt="2019-09-30T11:12:54.887" v="12" actId="20577"/>
+          <ac:spMkLst>
+            <pc:docMk/>
+            <pc:sldMk cId="3972362767" sldId="555"/>
+            <ac:spMk id="4099" creationId="{00000000-0000-0000-0000-000000000000}"/>
+          </ac:spMkLst>
+        </pc:spChg>
+      </pc:sldChg>
+    </pc:docChg>
+  </pc:docChgLst>
+  <pc:docChgLst>
     <pc:chgData name="Lipani, Aldo" userId="3d811883-7188-4056-86e4-ebeb30c53017" providerId="ADAL" clId="{0F96DCBF-1999-8A48-AF8F-6F61B3D65D07}"/>
     <pc:docChg chg="delSld modSld">
       <pc:chgData name="Lipani, Aldo" userId="3d811883-7188-4056-86e4-ebeb30c53017" providerId="ADAL" clId="{0F96DCBF-1999-8A48-AF8F-6F61B3D65D07}" dt="2020-10-03T14:53:44.302" v="56" actId="6549"/>
@@ -3815,7 +3815,7 @@
           <a:p>
             <a:fld id="{50C96C19-BA70-3844-814A-AB1DB87EE19E}" type="datetimeFigureOut">
               <a:rPr kumimoji="1" lang="zh-CN" altLang="en-US" smtClean="0"/>
-              <a:t>2020/10/3</a:t>
+              <a:t>2023/10/24</a:t>
             </a:fld>
             <a:endParaRPr kumimoji="1" lang="zh-CN" altLang="en-US"/>
           </a:p>
@@ -3997,7 +3997,7 @@
               <a:pPr>
                 <a:defRPr/>
               </a:pPr>
-              <a:t>10/3/20</a:t>
+              <a:t>10/24/23</a:t>
             </a:fld>
             <a:endParaRPr lang="en-US" altLang="zh-CN"/>
           </a:p>
@@ -8307,14 +8307,14 @@
           </a:ln>
           <a:extLst>
             <a:ext uri="{909E8E84-426E-40dd-AFC4-6F175D3DCCD1}">
-              <a14:hiddenFill xmlns="" xmlns:a14="http://schemas.microsoft.com/office/drawing/2010/main">
+              <a14:hiddenFill xmlns:a14="http://schemas.microsoft.com/office/drawing/2010/main" xmlns="">
                 <a:solidFill>
                   <a:srgbClr val="FFFFFF"/>
                 </a:solidFill>
               </a14:hiddenFill>
             </a:ext>
             <a:ext uri="{91240B29-F687-4f45-9708-019B960494DF}">
-              <a14:hiddenLine xmlns="" xmlns:a14="http://schemas.microsoft.com/office/drawing/2010/main" w="9525">
+              <a14:hiddenLine xmlns:a14="http://schemas.microsoft.com/office/drawing/2010/main" xmlns="" w="9525">
                 <a:solidFill>
                   <a:srgbClr val="000000"/>
                 </a:solidFill>
@@ -10165,14 +10165,14 @@
           </a:ln>
           <a:extLst>
             <a:ext uri="{909E8E84-426E-40dd-AFC4-6F175D3DCCD1}">
-              <a14:hiddenFill xmlns="" xmlns:a14="http://schemas.microsoft.com/office/drawing/2010/main">
+              <a14:hiddenFill xmlns:a14="http://schemas.microsoft.com/office/drawing/2010/main" xmlns="">
                 <a:solidFill>
                   <a:srgbClr val="FFFFFF"/>
                 </a:solidFill>
               </a14:hiddenFill>
             </a:ext>
             <a:ext uri="{91240B29-F687-4f45-9708-019B960494DF}">
-              <a14:hiddenLine xmlns="" xmlns:a14="http://schemas.microsoft.com/office/drawing/2010/main" w="9525">
+              <a14:hiddenLine xmlns:a14="http://schemas.microsoft.com/office/drawing/2010/main" xmlns="" w="9525">
                 <a:solidFill>
                   <a:srgbClr val="000000"/>
                 </a:solidFill>
@@ -10208,17 +10208,17 @@
           </a:ln>
           <a:extLst>
             <a:ext uri="{FAA26D3D-D897-4be2-8F04-BA451C77F1D7}">
-              <ma14:placeholderFlag xmlns:ma14="http://schemas.microsoft.com/office/mac/drawingml/2011/main" xmlns="" val="1"/>
+              <ma14:placeholderFlag xmlns="" xmlns:ma14="http://schemas.microsoft.com/office/mac/drawingml/2011/main" val="1"/>
             </a:ext>
             <a:ext uri="{909E8E84-426E-40dd-AFC4-6F175D3DCCD1}">
-              <a14:hiddenFill xmlns="" xmlns:a14="http://schemas.microsoft.com/office/drawing/2010/main">
+              <a14:hiddenFill xmlns:a14="http://schemas.microsoft.com/office/drawing/2010/main" xmlns="">
                 <a:solidFill>
                   <a:srgbClr val="FFFFFF"/>
                 </a:solidFill>
               </a14:hiddenFill>
             </a:ext>
             <a:ext uri="{91240B29-F687-4f45-9708-019B960494DF}">
-              <a14:hiddenLine xmlns="" xmlns:a14="http://schemas.microsoft.com/office/drawing/2010/main" w="9525">
+              <a14:hiddenLine xmlns:a14="http://schemas.microsoft.com/office/drawing/2010/main" xmlns="" w="9525">
                 <a:solidFill>
                   <a:srgbClr val="000000"/>
                 </a:solidFill>
@@ -10269,17 +10269,17 @@
           </a:ln>
           <a:extLst>
             <a:ext uri="{FAA26D3D-D897-4be2-8F04-BA451C77F1D7}">
-              <ma14:placeholderFlag xmlns:ma14="http://schemas.microsoft.com/office/mac/drawingml/2011/main" xmlns="" val="1"/>
+              <ma14:placeholderFlag xmlns="" xmlns:ma14="http://schemas.microsoft.com/office/mac/drawingml/2011/main" val="1"/>
             </a:ext>
             <a:ext uri="{909E8E84-426E-40dd-AFC4-6F175D3DCCD1}">
-              <a14:hiddenFill xmlns="" xmlns:a14="http://schemas.microsoft.com/office/drawing/2010/main">
+              <a14:hiddenFill xmlns:a14="http://schemas.microsoft.com/office/drawing/2010/main" xmlns="">
                 <a:solidFill>
                   <a:srgbClr val="FFFFFF"/>
                 </a:solidFill>
               </a14:hiddenFill>
             </a:ext>
             <a:ext uri="{91240B29-F687-4f45-9708-019B960494DF}">
-              <a14:hiddenLine xmlns="" xmlns:a14="http://schemas.microsoft.com/office/drawing/2010/main" w="9525">
+              <a14:hiddenLine xmlns:a14="http://schemas.microsoft.com/office/drawing/2010/main" xmlns="" w="9525">
                 <a:solidFill>
                   <a:srgbClr val="000000"/>
                 </a:solidFill>
@@ -10392,14 +10392,14 @@
           </a:ln>
           <a:extLst>
             <a:ext uri="{909E8E84-426E-40dd-AFC4-6F175D3DCCD1}">
-              <a14:hiddenFill xmlns="" xmlns:a14="http://schemas.microsoft.com/office/drawing/2010/main">
+              <a14:hiddenFill xmlns:a14="http://schemas.microsoft.com/office/drawing/2010/main" xmlns="">
                 <a:solidFill>
                   <a:srgbClr val="FFFFFF"/>
                 </a:solidFill>
               </a14:hiddenFill>
             </a:ext>
             <a:ext uri="{91240B29-F687-4f45-9708-019B960494DF}">
-              <a14:hiddenLine xmlns="" xmlns:a14="http://schemas.microsoft.com/office/drawing/2010/main" w="9525">
+              <a14:hiddenLine xmlns:a14="http://schemas.microsoft.com/office/drawing/2010/main" xmlns="" w="9525">
                 <a:solidFill>
                   <a:srgbClr val="000000"/>
                 </a:solidFill>
@@ -11036,19 +11036,19 @@
           <a:p>
             <a:r>
               <a:rPr lang="en-US" sz="1800" dirty="0"/>
-              <a:t>A polygon given 3 or more points;</a:t>
+              <a:t>A polygon, given 3 or more points;</a:t>
             </a:r>
           </a:p>
           <a:p>
             <a:r>
               <a:rPr lang="en-US" sz="1800" dirty="0"/>
-              <a:t>A triangle given 3 points;</a:t>
+              <a:t>A triangle, given 3 points;</a:t>
             </a:r>
           </a:p>
           <a:p>
             <a:r>
               <a:rPr lang="en-US" sz="1800" dirty="0"/>
-              <a:t>A square given its bottom left point and its side length.</a:t>
+              <a:t>A square, given its bottom left point and its side length.</a:t>
             </a:r>
           </a:p>
           <a:p>
@@ -11078,7 +11078,7 @@
             </a:pPr>
             <a:r>
               <a:rPr lang="en-US" sz="1800" dirty="0"/>
-              <a:t>TIP: use the Shoelace Formula to compute the are of a triangle given 3 points.</a:t>
+              <a:t>TIP: use the Shoelace Formula to compute the area of a triangle given 3 points.</a:t>
             </a:r>
           </a:p>
           <a:p>
@@ -16321,8 +16321,8 @@
           </a:p>
         </p:txBody>
       </p:sp>
-      <mc:AlternateContent xmlns:mc="http://schemas.openxmlformats.org/markup-compatibility/2006" xmlns:a14="http://schemas.microsoft.com/office/drawing/2010/main">
-        <mc:Choice Requires="a14">
+      <mc:AlternateContent xmlns:mc="http://schemas.openxmlformats.org/markup-compatibility/2006">
+        <mc:Choice xmlns:a14="http://schemas.microsoft.com/office/drawing/2010/main" Requires="a14">
           <p:sp>
             <p:nvSpPr>
               <p:cNvPr id="9" name="Content Placeholder 2">
@@ -16371,7 +16371,7 @@
                 </a:r>
                 <a:r>
                   <a:rPr lang="en-US" sz="1800" dirty="0"/>
-                  <a:t> a temperature in degree Celsius and </a:t>
+                  <a:t> a temperature in degrees Celsius and </a:t>
                 </a:r>
                 <a:r>
                   <a:rPr lang="en-GB" sz="1800" dirty="0">
@@ -17025,7 +17025,7 @@
             </p:txBody>
           </p:sp>
         </mc:Choice>
-        <mc:Fallback xmlns="">
+        <mc:Fallback>
           <p:sp>
             <p:nvSpPr>
               <p:cNvPr id="9" name="Content Placeholder 2">
@@ -17046,7 +17046,7 @@
               <a:blipFill>
                 <a:blip r:embed="rId3"/>
                 <a:stretch>
-                  <a:fillRect l="-448" t="-813" r="-149"/>
+                  <a:fillRect l="-448" t="-811"/>
                 </a:stretch>
               </a:blipFill>
             </p:spPr>
@@ -17055,7 +17055,7 @@
               <a:lstStyle/>
               <a:p>
                 <a:r>
-                  <a:rPr lang="en-US">
+                  <a:rPr lang="en-GB">
                     <a:noFill/>
                   </a:rPr>
                   <a:t> </a:t>

</xml_diff>